<commit_message>
Update Bitemporal - The Elephant in the Data Room 2019-05.pptx
</commit_message>
<xml_diff>
--- a/Bitemporal - The Elephant in the Data Room 2019-05.pptx
+++ b/Bitemporal - The Elephant in the Data Room 2019-05.pptx
@@ -2,26 +2,26 @@
 <file path=ppt/presentation.xml><?xml version="1.0" encoding="utf-8"?>
 <p:presentation xmlns:a="http://schemas.openxmlformats.org/drawingml/2006/main" xmlns:r="http://schemas.openxmlformats.org/officeDocument/2006/relationships" xmlns:p="http://schemas.openxmlformats.org/presentationml/2006/main" saveSubsetFonts="1">
   <p:sldMasterIdLst>
-    <p:sldMasterId id="2147483648" r:id="rId1"/>
+    <p:sldMasterId id="2147483648" r:id="rId5"/>
   </p:sldMasterIdLst>
   <p:sldIdLst>
-    <p:sldId id="256" r:id="rId2"/>
-    <p:sldId id="294" r:id="rId3"/>
-    <p:sldId id="316" r:id="rId4"/>
-    <p:sldId id="317" r:id="rId5"/>
-    <p:sldId id="319" r:id="rId6"/>
-    <p:sldId id="318" r:id="rId7"/>
-    <p:sldId id="320" r:id="rId8"/>
-    <p:sldId id="321" r:id="rId9"/>
-    <p:sldId id="322" r:id="rId10"/>
-    <p:sldId id="323" r:id="rId11"/>
-    <p:sldId id="324" r:id="rId12"/>
-    <p:sldId id="327" r:id="rId13"/>
-    <p:sldId id="325" r:id="rId14"/>
-    <p:sldId id="326" r:id="rId15"/>
-    <p:sldId id="295" r:id="rId16"/>
-    <p:sldId id="296" r:id="rId17"/>
-    <p:sldId id="309" r:id="rId18"/>
+    <p:sldId id="256" r:id="rId6"/>
+    <p:sldId id="294" r:id="rId7"/>
+    <p:sldId id="316" r:id="rId8"/>
+    <p:sldId id="317" r:id="rId9"/>
+    <p:sldId id="319" r:id="rId10"/>
+    <p:sldId id="318" r:id="rId11"/>
+    <p:sldId id="320" r:id="rId12"/>
+    <p:sldId id="321" r:id="rId13"/>
+    <p:sldId id="322" r:id="rId14"/>
+    <p:sldId id="323" r:id="rId15"/>
+    <p:sldId id="324" r:id="rId16"/>
+    <p:sldId id="327" r:id="rId17"/>
+    <p:sldId id="325" r:id="rId18"/>
+    <p:sldId id="326" r:id="rId19"/>
+    <p:sldId id="295" r:id="rId20"/>
+    <p:sldId id="296" r:id="rId21"/>
+    <p:sldId id="309" r:id="rId22"/>
   </p:sldIdLst>
   <p:sldSz cx="12192000" cy="6858000"/>
   <p:notesSz cx="6858000" cy="9144000"/>
@@ -139,6 +139,14 @@
 </p:presentation>
 </file>
 
+<file path=ppt/revisionInfo.xml><?xml version="1.0" encoding="utf-8"?>
+<p1510:revInfo xmlns:a="http://schemas.openxmlformats.org/drawingml/2006/main" xmlns:r="http://schemas.openxmlformats.org/officeDocument/2006/relationships" xmlns:p1510="http://schemas.microsoft.com/office/powerpoint/2015/10/main">
+  <p1510:revLst>
+    <p1510:client id="{AC3931F2-E1F6-43E5-8718-D9D85317AF4B}" v="3" dt="2020-12-01T13:38:27.297"/>
+  </p1510:revLst>
+</p1510:revInfo>
+</file>
+
 <file path=ppt/slideLayouts/slideLayout1.xml><?xml version="1.0" encoding="utf-8"?>
 <p:sldLayout xmlns:a="http://schemas.openxmlformats.org/drawingml/2006/main" xmlns:r="http://schemas.openxmlformats.org/officeDocument/2006/relationships" xmlns:p="http://schemas.openxmlformats.org/presentationml/2006/main" type="title" preserve="1">
   <p:cSld name="Titeldia">
@@ -269,7 +277,7 @@
             <a:fld id="{51438F46-960D-4D21-BBD6-7400CB069164}" type="datetimeFigureOut">
               <a:rPr lang="nl-NL" smtClean="0"/>
               <a:pPr/>
-              <a:t>17-5-2019</a:t>
+              <a:t>1-12-2020</a:t>
             </a:fld>
             <a:endParaRPr lang="nl-NL"/>
           </a:p>
@@ -439,7 +447,7 @@
             <a:fld id="{51438F46-960D-4D21-BBD6-7400CB069164}" type="datetimeFigureOut">
               <a:rPr lang="nl-NL" smtClean="0"/>
               <a:pPr/>
-              <a:t>17-5-2019</a:t>
+              <a:t>1-12-2020</a:t>
             </a:fld>
             <a:endParaRPr lang="nl-NL"/>
           </a:p>
@@ -619,7 +627,7 @@
             <a:fld id="{51438F46-960D-4D21-BBD6-7400CB069164}" type="datetimeFigureOut">
               <a:rPr lang="nl-NL" smtClean="0"/>
               <a:pPr/>
-              <a:t>17-5-2019</a:t>
+              <a:t>1-12-2020</a:t>
             </a:fld>
             <a:endParaRPr lang="nl-NL"/>
           </a:p>
@@ -789,7 +797,7 @@
             <a:fld id="{51438F46-960D-4D21-BBD6-7400CB069164}" type="datetimeFigureOut">
               <a:rPr lang="nl-NL" smtClean="0"/>
               <a:pPr/>
-              <a:t>17-5-2019</a:t>
+              <a:t>1-12-2020</a:t>
             </a:fld>
             <a:endParaRPr lang="nl-NL"/>
           </a:p>
@@ -1036,7 +1044,7 @@
             <a:fld id="{51438F46-960D-4D21-BBD6-7400CB069164}" type="datetimeFigureOut">
               <a:rPr lang="nl-NL" smtClean="0"/>
               <a:pPr/>
-              <a:t>17-5-2019</a:t>
+              <a:t>1-12-2020</a:t>
             </a:fld>
             <a:endParaRPr lang="nl-NL"/>
           </a:p>
@@ -1267,7 +1275,7 @@
             <a:fld id="{51438F46-960D-4D21-BBD6-7400CB069164}" type="datetimeFigureOut">
               <a:rPr lang="nl-NL" smtClean="0"/>
               <a:pPr/>
-              <a:t>17-5-2019</a:t>
+              <a:t>1-12-2020</a:t>
             </a:fld>
             <a:endParaRPr lang="nl-NL"/>
           </a:p>
@@ -1633,7 +1641,7 @@
             <a:fld id="{51438F46-960D-4D21-BBD6-7400CB069164}" type="datetimeFigureOut">
               <a:rPr lang="nl-NL" smtClean="0"/>
               <a:pPr/>
-              <a:t>17-5-2019</a:t>
+              <a:t>1-12-2020</a:t>
             </a:fld>
             <a:endParaRPr lang="nl-NL"/>
           </a:p>
@@ -1752,7 +1760,7 @@
             <a:fld id="{51438F46-960D-4D21-BBD6-7400CB069164}" type="datetimeFigureOut">
               <a:rPr lang="nl-NL" smtClean="0"/>
               <a:pPr/>
-              <a:t>17-5-2019</a:t>
+              <a:t>1-12-2020</a:t>
             </a:fld>
             <a:endParaRPr lang="nl-NL"/>
           </a:p>
@@ -1849,7 +1857,7 @@
             <a:fld id="{51438F46-960D-4D21-BBD6-7400CB069164}" type="datetimeFigureOut">
               <a:rPr lang="nl-NL" smtClean="0"/>
               <a:pPr/>
-              <a:t>17-5-2019</a:t>
+              <a:t>1-12-2020</a:t>
             </a:fld>
             <a:endParaRPr lang="nl-NL"/>
           </a:p>
@@ -2126,7 +2134,7 @@
             <a:fld id="{51438F46-960D-4D21-BBD6-7400CB069164}" type="datetimeFigureOut">
               <a:rPr lang="nl-NL" smtClean="0"/>
               <a:pPr/>
-              <a:t>17-5-2019</a:t>
+              <a:t>1-12-2020</a:t>
             </a:fld>
             <a:endParaRPr lang="nl-NL"/>
           </a:p>
@@ -2380,7 +2388,7 @@
             <a:fld id="{51438F46-960D-4D21-BBD6-7400CB069164}" type="datetimeFigureOut">
               <a:rPr lang="nl-NL" smtClean="0"/>
               <a:pPr/>
-              <a:t>17-5-2019</a:t>
+              <a:t>1-12-2020</a:t>
             </a:fld>
             <a:endParaRPr lang="nl-NL"/>
           </a:p>
@@ -2600,7 +2608,7 @@
             <a:fld id="{51438F46-960D-4D21-BBD6-7400CB069164}" type="datetimeFigureOut">
               <a:rPr lang="nl-NL" smtClean="0"/>
               <a:pPr/>
-              <a:t>17-5-2019</a:t>
+              <a:t>1-12-2020</a:t>
             </a:fld>
             <a:endParaRPr lang="nl-NL"/>
           </a:p>
@@ -10377,6 +10385,56 @@
 </file>
 
 <file path=customXml/item1.xml><?xml version="1.0" encoding="utf-8"?>
+<?mso-contentType ?>
+<spe:Receivers xmlns:spe="http://schemas.microsoft.com/sharepoint/events">
+  <Receiver>
+    <Name>Document ID Generator</Name>
+    <Synchronization>Synchronous</Synchronization>
+    <Type>10001</Type>
+    <SequenceNumber>1000</SequenceNumber>
+    <Url/>
+    <Assembly>Microsoft.Office.DocumentManagement, Version=16.0.0.0, Culture=neutral, PublicKeyToken=71e9bce111e9429c</Assembly>
+    <Class>Microsoft.Office.DocumentManagement.Internal.DocIdHandler</Class>
+    <Data/>
+    <Filter/>
+  </Receiver>
+  <Receiver>
+    <Name>Document ID Generator</Name>
+    <Synchronization>Synchronous</Synchronization>
+    <Type>10002</Type>
+    <SequenceNumber>1001</SequenceNumber>
+    <Url/>
+    <Assembly>Microsoft.Office.DocumentManagement, Version=16.0.0.0, Culture=neutral, PublicKeyToken=71e9bce111e9429c</Assembly>
+    <Class>Microsoft.Office.DocumentManagement.Internal.DocIdHandler</Class>
+    <Data/>
+    <Filter/>
+  </Receiver>
+  <Receiver>
+    <Name>Document ID Generator</Name>
+    <Synchronization>Synchronous</Synchronization>
+    <Type>10004</Type>
+    <SequenceNumber>1002</SequenceNumber>
+    <Url/>
+    <Assembly>Microsoft.Office.DocumentManagement, Version=16.0.0.0, Culture=neutral, PublicKeyToken=71e9bce111e9429c</Assembly>
+    <Class>Microsoft.Office.DocumentManagement.Internal.DocIdHandler</Class>
+    <Data/>
+    <Filter/>
+  </Receiver>
+  <Receiver>
+    <Name>Document ID Generator</Name>
+    <Synchronization>Synchronous</Synchronization>
+    <Type>10006</Type>
+    <SequenceNumber>1003</SequenceNumber>
+    <Url/>
+    <Assembly>Microsoft.Office.DocumentManagement, Version=16.0.0.0, Culture=neutral, PublicKeyToken=71e9bce111e9429c</Assembly>
+    <Class>Microsoft.Office.DocumentManagement.Internal.DocIdHandler</Class>
+    <Data/>
+    <Filter/>
+  </Receiver>
+</spe:Receivers>
+</file>
+
+<file path=customXml/item2.xml><?xml version="1.0" encoding="utf-8"?>
 <ct:contentTypeSchema xmlns:ct="http://schemas.microsoft.com/office/2006/metadata/contentType" xmlns:ma="http://schemas.microsoft.com/office/2006/metadata/properties/metaAttributes" ct:_="" ma:_="" ma:contentTypeName="Team Document" ma:contentTypeID="0x010100A35317DCC28344A7B82488658A034A5C0100E33A2D1838D7F947947CAE5E2EB244EC" ma:contentTypeVersion="7" ma:contentTypeDescription=" " ma:contentTypeScope="" ma:versionID="9323af3b3617076e8a29e0c1a1a86449">
   <xsd:schema xmlns:xsd="http://www.w3.org/2001/XMLSchema" xmlns:xs="http://www.w3.org/2001/XMLSchema" xmlns:p="http://schemas.microsoft.com/office/2006/metadata/properties" xmlns:ns2="e4ecb490-576a-4d0c-922c-f269d836583e" xmlns:ns3="2f6a910d-138e-42c1-8e8a-320c1b7cf3f7" xmlns:ns5="829e0527-382a-492f-a55b-01abf64fd60a" targetNamespace="http://schemas.microsoft.com/office/2006/metadata/properties" ma:root="true" ma:fieldsID="e6830c1cdf01e38ce4b70f63097a7d26" ns2:_="" ns3:_="" ns5:_="">
     <xsd:import namespace="e4ecb490-576a-4d0c-922c-f269d836583e"/>
@@ -10649,66 +10707,7 @@
 </ct:contentTypeSchema>
 </file>
 
-<file path=customXml/item2.xml><?xml version="1.0" encoding="utf-8"?>
-<?mso-contentType ?>
-<spe:Receivers xmlns:spe="http://schemas.microsoft.com/sharepoint/events">
-  <Receiver>
-    <Name>Document ID Generator</Name>
-    <Synchronization>Synchronous</Synchronization>
-    <Type>10001</Type>
-    <SequenceNumber>1000</SequenceNumber>
-    <Url/>
-    <Assembly>Microsoft.Office.DocumentManagement, Version=16.0.0.0, Culture=neutral, PublicKeyToken=71e9bce111e9429c</Assembly>
-    <Class>Microsoft.Office.DocumentManagement.Internal.DocIdHandler</Class>
-    <Data/>
-    <Filter/>
-  </Receiver>
-  <Receiver>
-    <Name>Document ID Generator</Name>
-    <Synchronization>Synchronous</Synchronization>
-    <Type>10002</Type>
-    <SequenceNumber>1001</SequenceNumber>
-    <Url/>
-    <Assembly>Microsoft.Office.DocumentManagement, Version=16.0.0.0, Culture=neutral, PublicKeyToken=71e9bce111e9429c</Assembly>
-    <Class>Microsoft.Office.DocumentManagement.Internal.DocIdHandler</Class>
-    <Data/>
-    <Filter/>
-  </Receiver>
-  <Receiver>
-    <Name>Document ID Generator</Name>
-    <Synchronization>Synchronous</Synchronization>
-    <Type>10004</Type>
-    <SequenceNumber>1002</SequenceNumber>
-    <Url/>
-    <Assembly>Microsoft.Office.DocumentManagement, Version=16.0.0.0, Culture=neutral, PublicKeyToken=71e9bce111e9429c</Assembly>
-    <Class>Microsoft.Office.DocumentManagement.Internal.DocIdHandler</Class>
-    <Data/>
-    <Filter/>
-  </Receiver>
-  <Receiver>
-    <Name>Document ID Generator</Name>
-    <Synchronization>Synchronous</Synchronization>
-    <Type>10006</Type>
-    <SequenceNumber>1003</SequenceNumber>
-    <Url/>
-    <Assembly>Microsoft.Office.DocumentManagement, Version=16.0.0.0, Culture=neutral, PublicKeyToken=71e9bce111e9429c</Assembly>
-    <Class>Microsoft.Office.DocumentManagement.Internal.DocIdHandler</Class>
-    <Data/>
-    <Filter/>
-  </Receiver>
-</spe:Receivers>
-</file>
-
 <file path=customXml/item3.xml><?xml version="1.0" encoding="utf-8"?>
-<?mso-contentType ?>
-<FormTemplates xmlns="http://schemas.microsoft.com/sharepoint/v3/contenttype/forms">
-  <Display>DocumentLibraryForm</Display>
-  <Edit>DocumentLibraryForm</Edit>
-  <New>DocumentLibraryForm</New>
-</FormTemplates>
-</file>
-
-<file path=customXml/item4.xml><?xml version="1.0" encoding="utf-8"?>
 <p:properties xmlns:p="http://schemas.microsoft.com/office/2006/metadata/properties" xmlns:xsi="http://www.w3.org/2001/XMLSchema-instance" xmlns:pc="http://schemas.microsoft.com/office/infopath/2007/PartnerControls">
   <documentManagement>
     <TNOC_ClusterId xmlns="2f6a910d-138e-42c1-8e8a-320c1b7cf3f7">060.38178</TNOC_ClusterId>
@@ -10751,18 +10750,65 @@
 </p:properties>
 </file>
 
+<file path=customXml/item4.xml><?xml version="1.0" encoding="utf-8"?>
+<?mso-contentType ?>
+<FormTemplates xmlns="http://schemas.microsoft.com/sharepoint/v3/contenttype/forms">
+  <Display>DocumentLibraryForm</Display>
+  <Edit>DocumentLibraryForm</Edit>
+  <New>DocumentLibraryForm</New>
+</FormTemplates>
+</file>
+
 <file path=customXml/itemProps1.xml><?xml version="1.0" encoding="utf-8"?>
-<ds:datastoreItem xmlns:ds="http://schemas.openxmlformats.org/officeDocument/2006/customXml" ds:itemID="{25E7E819-ECA6-4521-9BC7-85CD00E13FA5}"/>
+<ds:datastoreItem xmlns:ds="http://schemas.openxmlformats.org/officeDocument/2006/customXml" ds:itemID="{5A25A5BD-E108-4500-8608-B85D07812718}">
+  <ds:schemaRefs>
+    <ds:schemaRef ds:uri="http://schemas.microsoft.com/sharepoint/events"/>
+  </ds:schemaRefs>
+</ds:datastoreItem>
 </file>
 
 <file path=customXml/itemProps2.xml><?xml version="1.0" encoding="utf-8"?>
-<ds:datastoreItem xmlns:ds="http://schemas.openxmlformats.org/officeDocument/2006/customXml" ds:itemID="{5A25A5BD-E108-4500-8608-B85D07812718}"/>
+<ds:datastoreItem xmlns:ds="http://schemas.openxmlformats.org/officeDocument/2006/customXml" ds:itemID="{25E7E819-ECA6-4521-9BC7-85CD00E13FA5}">
+  <ds:schemaRefs>
+    <ds:schemaRef ds:uri="http://schemas.microsoft.com/office/2006/metadata/contentType"/>
+    <ds:schemaRef ds:uri="http://schemas.microsoft.com/office/2006/metadata/properties/metaAttributes"/>
+    <ds:schemaRef ds:uri="http://www.w3.org/2001/XMLSchema"/>
+    <ds:schemaRef ds:uri="http://schemas.microsoft.com/office/2006/metadata/properties"/>
+    <ds:schemaRef ds:uri="e4ecb490-576a-4d0c-922c-f269d836583e"/>
+    <ds:schemaRef ds:uri="2f6a910d-138e-42c1-8e8a-320c1b7cf3f7"/>
+    <ds:schemaRef ds:uri="829e0527-382a-492f-a55b-01abf64fd60a"/>
+    <ds:schemaRef ds:uri="http://schemas.microsoft.com/office/2006/documentManagement/types"/>
+    <ds:schemaRef ds:uri="http://schemas.microsoft.com/office/infopath/2007/PartnerControls"/>
+    <ds:schemaRef ds:uri="http://schemas.openxmlformats.org/package/2006/metadata/core-properties"/>
+    <ds:schemaRef ds:uri="http://purl.org/dc/elements/1.1/"/>
+    <ds:schemaRef ds:uri="http://purl.org/dc/terms/"/>
+    <ds:schemaRef ds:uri="http://schemas.microsoft.com/internal/obd"/>
+  </ds:schemaRefs>
+</ds:datastoreItem>
 </file>
 
 <file path=customXml/itemProps3.xml><?xml version="1.0" encoding="utf-8"?>
-<ds:datastoreItem xmlns:ds="http://schemas.openxmlformats.org/officeDocument/2006/customXml" ds:itemID="{D9D850C3-78B5-4FD6-BBC0-5CE7AFC54995}"/>
+<ds:datastoreItem xmlns:ds="http://schemas.openxmlformats.org/officeDocument/2006/customXml" ds:itemID="{5FD9A582-8EF0-41F7-926A-E98CE7464309}">
+  <ds:schemaRefs>
+    <ds:schemaRef ds:uri="829e0527-382a-492f-a55b-01abf64fd60a"/>
+    <ds:schemaRef ds:uri="http://schemas.microsoft.com/office/2006/documentManagement/types"/>
+    <ds:schemaRef ds:uri="e4ecb490-576a-4d0c-922c-f269d836583e"/>
+    <ds:schemaRef ds:uri="http://schemas.microsoft.com/office/infopath/2007/PartnerControls"/>
+    <ds:schemaRef ds:uri="http://schemas.openxmlformats.org/package/2006/metadata/core-properties"/>
+    <ds:schemaRef ds:uri="http://www.w3.org/XML/1998/namespace"/>
+    <ds:schemaRef ds:uri="http://purl.org/dc/dcmitype/"/>
+    <ds:schemaRef ds:uri="http://schemas.microsoft.com/office/2006/metadata/properties"/>
+    <ds:schemaRef ds:uri="2f6a910d-138e-42c1-8e8a-320c1b7cf3f7"/>
+    <ds:schemaRef ds:uri="http://purl.org/dc/terms/"/>
+    <ds:schemaRef ds:uri="http://purl.org/dc/elements/1.1/"/>
+  </ds:schemaRefs>
+</ds:datastoreItem>
 </file>
 
 <file path=customXml/itemProps4.xml><?xml version="1.0" encoding="utf-8"?>
-<ds:datastoreItem xmlns:ds="http://schemas.openxmlformats.org/officeDocument/2006/customXml" ds:itemID="{5FD9A582-8EF0-41F7-926A-E98CE7464309}"/>
+<ds:datastoreItem xmlns:ds="http://schemas.openxmlformats.org/officeDocument/2006/customXml" ds:itemID="{D9D850C3-78B5-4FD6-BBC0-5CE7AFC54995}">
+  <ds:schemaRefs>
+    <ds:schemaRef ds:uri="http://schemas.microsoft.com/sharepoint/v3/contenttype/forms"/>
+  </ds:schemaRefs>
+</ds:datastoreItem>
 </file>
</xml_diff>